<commit_message>
Updated the summary and introduction
</commit_message>
<xml_diff>
--- a/Presentations/OGC API Hackathon Outcomes.pptx
+++ b/Presentations/OGC API Hackathon Outcomes.pptx
@@ -5,17 +5,19 @@
     <p:sldMasterId id="2147483654" r:id="rId1"/>
   </p:sldMasterIdLst>
   <p:notesMasterIdLst>
-    <p:notesMasterId r:id="rId7"/>
+    <p:notesMasterId r:id="rId9"/>
   </p:notesMasterIdLst>
   <p:handoutMasterIdLst>
-    <p:handoutMasterId r:id="rId8"/>
+    <p:handoutMasterId r:id="rId10"/>
   </p:handoutMasterIdLst>
   <p:sldIdLst>
     <p:sldId id="256" r:id="rId2"/>
     <p:sldId id="2041" r:id="rId3"/>
     <p:sldId id="2042" r:id="rId4"/>
     <p:sldId id="2040" r:id="rId5"/>
-    <p:sldId id="2046" r:id="rId6"/>
+    <p:sldId id="2047" r:id="rId6"/>
+    <p:sldId id="2046" r:id="rId7"/>
+    <p:sldId id="2048" r:id="rId8"/>
   </p:sldIdLst>
   <p:sldSz cx="9144000" cy="6858000" type="screen4x3"/>
   <p:notesSz cx="6904038" cy="9220200"/>
@@ -5344,6 +5346,132 @@
           <p:cNvPr id="2" name="Title 1">
             <a:extLst>
               <a:ext uri="{FF2B5EF4-FFF2-40B4-BE49-F238E27FC236}">
+                <a16:creationId xmlns:a16="http://schemas.microsoft.com/office/drawing/2014/main" id="{93944369-A8AE-4942-80EC-CB71D1FFEBE9}"/>
+              </a:ext>
+            </a:extLst>
+          </p:cNvPr>
+          <p:cNvSpPr>
+            <a:spLocks noGrp="1"/>
+          </p:cNvSpPr>
+          <p:nvPr>
+            <p:ph type="title"/>
+          </p:nvPr>
+        </p:nvSpPr>
+        <p:spPr/>
+        <p:txBody>
+          <a:bodyPr/>
+          <a:lstStyle/>
+          <a:p>
+            <a:r>
+              <a:rPr lang="en-US" dirty="0"/>
+              <a:t>Architecture</a:t>
+            </a:r>
+          </a:p>
+        </p:txBody>
+      </p:sp>
+      <p:sp>
+        <p:nvSpPr>
+          <p:cNvPr id="4" name="Footer Placeholder 3">
+            <a:extLst>
+              <a:ext uri="{FF2B5EF4-FFF2-40B4-BE49-F238E27FC236}">
+                <a16:creationId xmlns:a16="http://schemas.microsoft.com/office/drawing/2014/main" id="{93F51ADB-99C4-ED42-9D12-2A806C40C5FE}"/>
+              </a:ext>
+            </a:extLst>
+          </p:cNvPr>
+          <p:cNvSpPr>
+            <a:spLocks noGrp="1"/>
+          </p:cNvSpPr>
+          <p:nvPr>
+            <p:ph type="ftr" sz="quarter" idx="10"/>
+          </p:nvPr>
+        </p:nvSpPr>
+        <p:spPr/>
+        <p:txBody>
+          <a:bodyPr/>
+          <a:lstStyle/>
+          <a:p>
+            <a:pPr>
+              <a:defRPr/>
+            </a:pPr>
+            <a:r>
+              <a:rPr lang="en-US" altLang="en-US"/>
+              <a:t>Copyright © 2019 Open Geospatial Consortium</a:t>
+            </a:r>
+            <a:endParaRPr lang="en-US" altLang="en-US" dirty="0"/>
+          </a:p>
+        </p:txBody>
+      </p:sp>
+      <p:pic>
+        <p:nvPicPr>
+          <p:cNvPr id="6" name="Picture 5">
+            <a:extLst>
+              <a:ext uri="{FF2B5EF4-FFF2-40B4-BE49-F238E27FC236}">
+                <a16:creationId xmlns:a16="http://schemas.microsoft.com/office/drawing/2014/main" id="{6380FCE4-49CB-F941-B188-BF80C97197E9}"/>
+              </a:ext>
+            </a:extLst>
+          </p:cNvPr>
+          <p:cNvPicPr>
+            <a:picLocks noChangeAspect="1"/>
+          </p:cNvPicPr>
+          <p:nvPr/>
+        </p:nvPicPr>
+        <p:blipFill>
+          <a:blip r:embed="rId2">
+            <a:extLst>
+              <a:ext uri="{28A0092B-C50C-407E-A947-70E740481C1C}">
+                <a14:useLocalDpi xmlns:a14="http://schemas.microsoft.com/office/drawing/2010/main" val="0"/>
+              </a:ext>
+            </a:extLst>
+          </a:blip>
+          <a:stretch>
+            <a:fillRect/>
+          </a:stretch>
+        </p:blipFill>
+        <p:spPr>
+          <a:xfrm>
+            <a:off x="1752600" y="938212"/>
+            <a:ext cx="6807200" cy="5499100"/>
+          </a:xfrm>
+          <a:prstGeom prst="rect">
+            <a:avLst/>
+          </a:prstGeom>
+        </p:spPr>
+      </p:pic>
+    </p:spTree>
+    <p:extLst>
+      <p:ext uri="{BB962C8B-B14F-4D97-AF65-F5344CB8AC3E}">
+        <p14:creationId xmlns:p14="http://schemas.microsoft.com/office/powerpoint/2010/main" val="1476699010"/>
+      </p:ext>
+    </p:extLst>
+  </p:cSld>
+  <p:clrMapOvr>
+    <a:masterClrMapping/>
+  </p:clrMapOvr>
+</p:sld>
+</file>
+
+<file path=ppt/slides/slide6.xml><?xml version="1.0" encoding="utf-8"?>
+<p:sld xmlns:a="http://schemas.openxmlformats.org/drawingml/2006/main" xmlns:r="http://schemas.openxmlformats.org/officeDocument/2006/relationships" xmlns:p="http://schemas.openxmlformats.org/presentationml/2006/main">
+  <p:cSld>
+    <p:spTree>
+      <p:nvGrpSpPr>
+        <p:cNvPr id="1" name=""/>
+        <p:cNvGrpSpPr/>
+        <p:nvPr/>
+      </p:nvGrpSpPr>
+      <p:grpSpPr>
+        <a:xfrm>
+          <a:off x="0" y="0"/>
+          <a:ext cx="0" cy="0"/>
+          <a:chOff x="0" y="0"/>
+          <a:chExt cx="0" cy="0"/>
+        </a:xfrm>
+      </p:grpSpPr>
+      <p:sp>
+        <p:nvSpPr>
+          <p:cNvPr id="2" name="Title 1">
+            <a:extLst>
+              <a:ext uri="{FF2B5EF4-FFF2-40B4-BE49-F238E27FC236}">
                 <a16:creationId xmlns:a16="http://schemas.microsoft.com/office/drawing/2014/main" id="{9A461F37-0C9D-E342-B599-64FADD32A441}"/>
               </a:ext>
             </a:extLst>
@@ -5435,10 +5563,202 @@
           </a:prstGeom>
         </p:spPr>
       </p:pic>
+      <p:sp>
+        <p:nvSpPr>
+          <p:cNvPr id="9" name="TextBox 8">
+            <a:extLst>
+              <a:ext uri="{FF2B5EF4-FFF2-40B4-BE49-F238E27FC236}">
+                <a16:creationId xmlns:a16="http://schemas.microsoft.com/office/drawing/2014/main" id="{84B6104F-C64D-CE49-8ED4-0DAFE885C9C5}"/>
+              </a:ext>
+            </a:extLst>
+          </p:cNvPr>
+          <p:cNvSpPr txBox="1"/>
+          <p:nvPr/>
+        </p:nvSpPr>
+        <p:spPr>
+          <a:xfrm>
+            <a:off x="2438400" y="6096000"/>
+            <a:ext cx="5029200" cy="381000"/>
+          </a:xfrm>
+          <a:prstGeom prst="rect">
+            <a:avLst/>
+          </a:prstGeom>
+          <a:noFill/>
+        </p:spPr>
+        <p:txBody>
+          <a:bodyPr wrap="square" rtlCol="0">
+            <a:noAutofit/>
+          </a:bodyPr>
+          <a:lstStyle/>
+          <a:p>
+            <a:r>
+              <a:rPr lang="en-US" sz="1800" dirty="0">
+                <a:solidFill>
+                  <a:srgbClr val="FF0000"/>
+                </a:solidFill>
+              </a:rPr>
+              <a:t>Let me know if your service or client is missing</a:t>
+            </a:r>
+          </a:p>
+        </p:txBody>
+      </p:sp>
     </p:spTree>
     <p:extLst>
       <p:ext uri="{BB962C8B-B14F-4D97-AF65-F5344CB8AC3E}">
         <p14:creationId xmlns:p14="http://schemas.microsoft.com/office/powerpoint/2010/main" val="2357679750"/>
+      </p:ext>
+    </p:extLst>
+  </p:cSld>
+  <p:clrMapOvr>
+    <a:masterClrMapping/>
+  </p:clrMapOvr>
+</p:sld>
+</file>
+
+<file path=ppt/slides/slide7.xml><?xml version="1.0" encoding="utf-8"?>
+<p:sld xmlns:a="http://schemas.openxmlformats.org/drawingml/2006/main" xmlns:r="http://schemas.openxmlformats.org/officeDocument/2006/relationships" xmlns:p="http://schemas.openxmlformats.org/presentationml/2006/main">
+  <p:cSld>
+    <p:spTree>
+      <p:nvGrpSpPr>
+        <p:cNvPr id="1" name=""/>
+        <p:cNvGrpSpPr/>
+        <p:nvPr/>
+      </p:nvGrpSpPr>
+      <p:grpSpPr>
+        <a:xfrm>
+          <a:off x="0" y="0"/>
+          <a:ext cx="0" cy="0"/>
+          <a:chOff x="0" y="0"/>
+          <a:chExt cx="0" cy="0"/>
+        </a:xfrm>
+      </p:grpSpPr>
+      <p:sp>
+        <p:nvSpPr>
+          <p:cNvPr id="2" name="Title 1">
+            <a:extLst>
+              <a:ext uri="{FF2B5EF4-FFF2-40B4-BE49-F238E27FC236}">
+                <a16:creationId xmlns:a16="http://schemas.microsoft.com/office/drawing/2014/main" id="{79F27B57-F384-1F45-A253-324B9884994B}"/>
+              </a:ext>
+            </a:extLst>
+          </p:cNvPr>
+          <p:cNvSpPr>
+            <a:spLocks noGrp="1"/>
+          </p:cNvSpPr>
+          <p:nvPr>
+            <p:ph type="title"/>
+          </p:nvPr>
+        </p:nvSpPr>
+        <p:spPr/>
+        <p:txBody>
+          <a:bodyPr/>
+          <a:lstStyle/>
+          <a:p>
+            <a:r>
+              <a:rPr lang="en-US" dirty="0"/>
+              <a:t>Reflective Summary</a:t>
+            </a:r>
+          </a:p>
+        </p:txBody>
+      </p:sp>
+      <p:sp>
+        <p:nvSpPr>
+          <p:cNvPr id="3" name="Content Placeholder 2">
+            <a:extLst>
+              <a:ext uri="{FF2B5EF4-FFF2-40B4-BE49-F238E27FC236}">
+                <a16:creationId xmlns:a16="http://schemas.microsoft.com/office/drawing/2014/main" id="{90F605A2-FBB0-684A-8641-02A333755907}"/>
+              </a:ext>
+            </a:extLst>
+          </p:cNvPr>
+          <p:cNvSpPr>
+            <a:spLocks noGrp="1"/>
+          </p:cNvSpPr>
+          <p:nvPr>
+            <p:ph idx="1"/>
+          </p:nvPr>
+        </p:nvSpPr>
+        <p:spPr>
+          <a:xfrm>
+            <a:off x="346075" y="1279525"/>
+            <a:ext cx="8458200" cy="4891088"/>
+          </a:xfrm>
+        </p:spPr>
+        <p:txBody>
+          <a:bodyPr/>
+          <a:lstStyle/>
+          <a:p>
+            <a:r>
+              <a:rPr lang="en-US" dirty="0"/>
+              <a:t>Developed, deployed and tested services/clients that support OGC APIs</a:t>
+            </a:r>
+          </a:p>
+          <a:p>
+            <a:r>
+              <a:rPr lang="en-US" dirty="0"/>
+              <a:t>Suggested and made several improvements to the common core</a:t>
+            </a:r>
+          </a:p>
+          <a:p>
+            <a:r>
+              <a:rPr lang="en-US" dirty="0"/>
+              <a:t>Defined rules and designed guidance for documentation in the specification</a:t>
+            </a:r>
+          </a:p>
+          <a:p>
+            <a:r>
+              <a:rPr lang="en-US" dirty="0"/>
+              <a:t>Validated work that has been completed to date</a:t>
+            </a:r>
+          </a:p>
+          <a:p>
+            <a:r>
+              <a:rPr lang="en-US" dirty="0"/>
+              <a:t>Contributed to the GitHub repositories</a:t>
+            </a:r>
+          </a:p>
+          <a:p>
+            <a:endParaRPr lang="en-US" dirty="0"/>
+          </a:p>
+          <a:p>
+            <a:endParaRPr lang="en-US" dirty="0"/>
+          </a:p>
+        </p:txBody>
+      </p:sp>
+      <p:sp>
+        <p:nvSpPr>
+          <p:cNvPr id="4" name="Footer Placeholder 3">
+            <a:extLst>
+              <a:ext uri="{FF2B5EF4-FFF2-40B4-BE49-F238E27FC236}">
+                <a16:creationId xmlns:a16="http://schemas.microsoft.com/office/drawing/2014/main" id="{708EB8BE-D98E-CA4C-97FB-69CC26520C4B}"/>
+              </a:ext>
+            </a:extLst>
+          </p:cNvPr>
+          <p:cNvSpPr>
+            <a:spLocks noGrp="1"/>
+          </p:cNvSpPr>
+          <p:nvPr>
+            <p:ph type="ftr" sz="quarter" idx="10"/>
+          </p:nvPr>
+        </p:nvSpPr>
+        <p:spPr/>
+        <p:txBody>
+          <a:bodyPr/>
+          <a:lstStyle/>
+          <a:p>
+            <a:pPr>
+              <a:defRPr/>
+            </a:pPr>
+            <a:r>
+              <a:rPr lang="en-US" altLang="en-US"/>
+              <a:t>Copyright © 2019 Open Geospatial Consortium</a:t>
+            </a:r>
+            <a:endParaRPr lang="en-US" altLang="en-US" dirty="0"/>
+          </a:p>
+        </p:txBody>
+      </p:sp>
+    </p:spTree>
+    <p:extLst>
+      <p:ext uri="{BB962C8B-B14F-4D97-AF65-F5344CB8AC3E}">
+        <p14:creationId xmlns:p14="http://schemas.microsoft.com/office/powerpoint/2010/main" val="659766574"/>
       </p:ext>
     </p:extLst>
   </p:cSld>

</xml_diff>